<commit_message>
Updated user and developer guides
</commit_message>
<xml_diff>
--- a/docs/diagrams/ModelComponentClassDiagram.pptx
+++ b/docs/diagrams/ModelComponentClassDiagram.pptx
@@ -109,7 +109,7 @@
   </p:defaultTextStyle>
   <p:extLst>
     <p:ext uri="{EFAFB233-063F-42B5-8137-9DF3F51BA10A}">
-      <p15:sldGuideLst xmlns="" xmlns:p15="http://schemas.microsoft.com/office/powerpoint/2012/main">
+      <p15:sldGuideLst xmlns:p15="http://schemas.microsoft.com/office/powerpoint/2012/main">
         <p15:guide id="1" orient="horz" pos="1488">
           <p15:clr>
             <a:srgbClr val="A4A3A4"/>
@@ -124,6 +124,10 @@
     </p:ext>
   </p:extLst>
 </p:presentation>
+</file>
+
+<file path=ppt/revisionInfo.xml><?xml version="1.0" encoding="utf-8"?>
+<p1510:revInfo xmlns:a="http://schemas.openxmlformats.org/drawingml/2006/main" xmlns:r="http://schemas.openxmlformats.org/officeDocument/2006/relationships" xmlns:p1510="http://schemas.microsoft.com/office/powerpoint/2015/10/main"/>
 </file>
 
 <file path=ppt/notesMasters/notesMaster1.xml><?xml version="1.0" encoding="utf-8"?>
@@ -209,7 +213,7 @@
             <a:fld id="{F5CC4B3F-88C1-4FFA-B1B6-F41C21DC6924}" type="datetimeFigureOut">
               <a:rPr lang="en-US" smtClean="0"/>
               <a:pPr/>
-              <a:t>10/22/2017</a:t>
+              <a:t>10/24/2017</a:t>
             </a:fld>
             <a:endParaRPr lang="en-US"/>
           </a:p>
@@ -273,38 +277,37 @@
           <a:p>
             <a:pPr lvl="0"/>
             <a:r>
-              <a:rPr lang="en-US" smtClean="0"/>
+              <a:rPr lang="en-US"/>
               <a:t>Click to edit Master text styles</a:t>
             </a:r>
           </a:p>
           <a:p>
             <a:pPr lvl="1"/>
             <a:r>
-              <a:rPr lang="en-US" smtClean="0"/>
+              <a:rPr lang="en-US"/>
               <a:t>Second level</a:t>
             </a:r>
           </a:p>
           <a:p>
             <a:pPr lvl="2"/>
             <a:r>
-              <a:rPr lang="en-US" smtClean="0"/>
+              <a:rPr lang="en-US"/>
               <a:t>Third level</a:t>
             </a:r>
           </a:p>
           <a:p>
             <a:pPr lvl="3"/>
             <a:r>
-              <a:rPr lang="en-US" smtClean="0"/>
+              <a:rPr lang="en-US"/>
               <a:t>Fourth level</a:t>
             </a:r>
           </a:p>
           <a:p>
             <a:pPr lvl="4"/>
             <a:r>
-              <a:rPr lang="en-US" smtClean="0"/>
+              <a:rPr lang="en-US"/>
               <a:t>Fifth level</a:t>
             </a:r>
-            <a:endParaRPr lang="en-US"/>
           </a:p>
         </p:txBody>
       </p:sp>
@@ -378,7 +381,7 @@
     </p:spTree>
     <p:extLst>
       <p:ext uri="{BB962C8B-B14F-4D97-AF65-F5344CB8AC3E}">
-        <p14:creationId xmlns="" xmlns:p14="http://schemas.microsoft.com/office/powerpoint/2010/main" val="2023976206"/>
+        <p14:creationId xmlns:p14="http://schemas.microsoft.com/office/powerpoint/2010/main" val="2023976206"/>
       </p:ext>
     </p:extLst>
   </p:cSld>
@@ -516,10 +519,9 @@
           <a:lstStyle/>
           <a:p>
             <a:r>
-              <a:rPr lang="en-US" smtClean="0"/>
+              <a:rPr lang="en-US"/>
               <a:t>Click to edit Master title style</a:t>
             </a:r>
-            <a:endParaRPr lang="en-US"/>
           </a:p>
         </p:txBody>
       </p:sp>
@@ -635,10 +637,9 @@
           </a:lstStyle>
           <a:p>
             <a:r>
-              <a:rPr lang="en-US" smtClean="0"/>
+              <a:rPr lang="en-US"/>
               <a:t>Click to edit Master subtitle style</a:t>
             </a:r>
-            <a:endParaRPr lang="en-US"/>
           </a:p>
         </p:txBody>
       </p:sp>
@@ -660,7 +661,7 @@
             <a:fld id="{78C97017-6FC3-485B-9764-EAC9E56C1D49}" type="datetimeFigureOut">
               <a:rPr lang="en-US" smtClean="0"/>
               <a:pPr/>
-              <a:t>10/22/2017</a:t>
+              <a:t>10/24/2017</a:t>
             </a:fld>
             <a:endParaRPr lang="en-US"/>
           </a:p>
@@ -712,7 +713,7 @@
     </p:spTree>
     <p:extLst>
       <p:ext uri="{BB962C8B-B14F-4D97-AF65-F5344CB8AC3E}">
-        <p14:creationId xmlns="" xmlns:p14="http://schemas.microsoft.com/office/powerpoint/2010/main" val="3246593157"/>
+        <p14:creationId xmlns:p14="http://schemas.microsoft.com/office/powerpoint/2010/main" val="3246593157"/>
       </p:ext>
     </p:extLst>
   </p:cSld>
@@ -755,10 +756,9 @@
           <a:lstStyle/>
           <a:p>
             <a:r>
-              <a:rPr lang="en-US" smtClean="0"/>
+              <a:rPr lang="en-US"/>
               <a:t>Click to edit Master title style</a:t>
             </a:r>
-            <a:endParaRPr lang="en-US"/>
           </a:p>
         </p:txBody>
       </p:sp>
@@ -779,38 +779,37 @@
           <a:p>
             <a:pPr lvl="0"/>
             <a:r>
-              <a:rPr lang="en-US" smtClean="0"/>
+              <a:rPr lang="en-US"/>
               <a:t>Click to edit Master text styles</a:t>
             </a:r>
           </a:p>
           <a:p>
             <a:pPr lvl="1"/>
             <a:r>
-              <a:rPr lang="en-US" smtClean="0"/>
+              <a:rPr lang="en-US"/>
               <a:t>Second level</a:t>
             </a:r>
           </a:p>
           <a:p>
             <a:pPr lvl="2"/>
             <a:r>
-              <a:rPr lang="en-US" smtClean="0"/>
+              <a:rPr lang="en-US"/>
               <a:t>Third level</a:t>
             </a:r>
           </a:p>
           <a:p>
             <a:pPr lvl="3"/>
             <a:r>
-              <a:rPr lang="en-US" smtClean="0"/>
+              <a:rPr lang="en-US"/>
               <a:t>Fourth level</a:t>
             </a:r>
           </a:p>
           <a:p>
             <a:pPr lvl="4"/>
             <a:r>
-              <a:rPr lang="en-US" smtClean="0"/>
+              <a:rPr lang="en-US"/>
               <a:t>Fifth level</a:t>
             </a:r>
-            <a:endParaRPr lang="en-US"/>
           </a:p>
         </p:txBody>
       </p:sp>
@@ -832,7 +831,7 @@
             <a:fld id="{78C97017-6FC3-485B-9764-EAC9E56C1D49}" type="datetimeFigureOut">
               <a:rPr lang="en-US" smtClean="0"/>
               <a:pPr/>
-              <a:t>10/22/2017</a:t>
+              <a:t>10/24/2017</a:t>
             </a:fld>
             <a:endParaRPr lang="en-US"/>
           </a:p>
@@ -884,7 +883,7 @@
     </p:spTree>
     <p:extLst>
       <p:ext uri="{BB962C8B-B14F-4D97-AF65-F5344CB8AC3E}">
-        <p14:creationId xmlns="" xmlns:p14="http://schemas.microsoft.com/office/powerpoint/2010/main" val="2707025021"/>
+        <p14:creationId xmlns:p14="http://schemas.microsoft.com/office/powerpoint/2010/main" val="2707025021"/>
       </p:ext>
     </p:extLst>
   </p:cSld>
@@ -932,10 +931,9 @@
           <a:lstStyle/>
           <a:p>
             <a:r>
-              <a:rPr lang="en-US" smtClean="0"/>
+              <a:rPr lang="en-US"/>
               <a:t>Click to edit Master title style</a:t>
             </a:r>
-            <a:endParaRPr lang="en-US"/>
           </a:p>
         </p:txBody>
       </p:sp>
@@ -961,38 +959,37 @@
           <a:p>
             <a:pPr lvl="0"/>
             <a:r>
-              <a:rPr lang="en-US" smtClean="0"/>
+              <a:rPr lang="en-US"/>
               <a:t>Click to edit Master text styles</a:t>
             </a:r>
           </a:p>
           <a:p>
             <a:pPr lvl="1"/>
             <a:r>
-              <a:rPr lang="en-US" smtClean="0"/>
+              <a:rPr lang="en-US"/>
               <a:t>Second level</a:t>
             </a:r>
           </a:p>
           <a:p>
             <a:pPr lvl="2"/>
             <a:r>
-              <a:rPr lang="en-US" smtClean="0"/>
+              <a:rPr lang="en-US"/>
               <a:t>Third level</a:t>
             </a:r>
           </a:p>
           <a:p>
             <a:pPr lvl="3"/>
             <a:r>
-              <a:rPr lang="en-US" smtClean="0"/>
+              <a:rPr lang="en-US"/>
               <a:t>Fourth level</a:t>
             </a:r>
           </a:p>
           <a:p>
             <a:pPr lvl="4"/>
             <a:r>
-              <a:rPr lang="en-US" smtClean="0"/>
+              <a:rPr lang="en-US"/>
               <a:t>Fifth level</a:t>
             </a:r>
-            <a:endParaRPr lang="en-US"/>
           </a:p>
         </p:txBody>
       </p:sp>
@@ -1014,7 +1011,7 @@
             <a:fld id="{78C97017-6FC3-485B-9764-EAC9E56C1D49}" type="datetimeFigureOut">
               <a:rPr lang="en-US" smtClean="0"/>
               <a:pPr/>
-              <a:t>10/22/2017</a:t>
+              <a:t>10/24/2017</a:t>
             </a:fld>
             <a:endParaRPr lang="en-US"/>
           </a:p>
@@ -1066,7 +1063,7 @@
     </p:spTree>
     <p:extLst>
       <p:ext uri="{BB962C8B-B14F-4D97-AF65-F5344CB8AC3E}">
-        <p14:creationId xmlns="" xmlns:p14="http://schemas.microsoft.com/office/powerpoint/2010/main" val="568378986"/>
+        <p14:creationId xmlns:p14="http://schemas.microsoft.com/office/powerpoint/2010/main" val="568378986"/>
       </p:ext>
     </p:extLst>
   </p:cSld>
@@ -1109,10 +1106,9 @@
           <a:lstStyle/>
           <a:p>
             <a:r>
-              <a:rPr lang="en-US" smtClean="0"/>
+              <a:rPr lang="en-US"/>
               <a:t>Click to edit Master title style</a:t>
             </a:r>
-            <a:endParaRPr lang="en-US"/>
           </a:p>
         </p:txBody>
       </p:sp>
@@ -1133,38 +1129,37 @@
           <a:p>
             <a:pPr lvl="0"/>
             <a:r>
-              <a:rPr lang="en-US" smtClean="0"/>
+              <a:rPr lang="en-US"/>
               <a:t>Click to edit Master text styles</a:t>
             </a:r>
           </a:p>
           <a:p>
             <a:pPr lvl="1"/>
             <a:r>
-              <a:rPr lang="en-US" smtClean="0"/>
+              <a:rPr lang="en-US"/>
               <a:t>Second level</a:t>
             </a:r>
           </a:p>
           <a:p>
             <a:pPr lvl="2"/>
             <a:r>
-              <a:rPr lang="en-US" smtClean="0"/>
+              <a:rPr lang="en-US"/>
               <a:t>Third level</a:t>
             </a:r>
           </a:p>
           <a:p>
             <a:pPr lvl="3"/>
             <a:r>
-              <a:rPr lang="en-US" smtClean="0"/>
+              <a:rPr lang="en-US"/>
               <a:t>Fourth level</a:t>
             </a:r>
           </a:p>
           <a:p>
             <a:pPr lvl="4"/>
             <a:r>
-              <a:rPr lang="en-US" smtClean="0"/>
+              <a:rPr lang="en-US"/>
               <a:t>Fifth level</a:t>
             </a:r>
-            <a:endParaRPr lang="en-US"/>
           </a:p>
         </p:txBody>
       </p:sp>
@@ -1186,7 +1181,7 @@
             <a:fld id="{78C97017-6FC3-485B-9764-EAC9E56C1D49}" type="datetimeFigureOut">
               <a:rPr lang="en-US" smtClean="0"/>
               <a:pPr/>
-              <a:t>10/22/2017</a:t>
+              <a:t>10/24/2017</a:t>
             </a:fld>
             <a:endParaRPr lang="en-US"/>
           </a:p>
@@ -1238,7 +1233,7 @@
     </p:spTree>
     <p:extLst>
       <p:ext uri="{BB962C8B-B14F-4D97-AF65-F5344CB8AC3E}">
-        <p14:creationId xmlns="" xmlns:p14="http://schemas.microsoft.com/office/powerpoint/2010/main" val="266658052"/>
+        <p14:creationId xmlns:p14="http://schemas.microsoft.com/office/powerpoint/2010/main" val="266658052"/>
       </p:ext>
     </p:extLst>
   </p:cSld>
@@ -1290,10 +1285,9 @@
           </a:lstStyle>
           <a:p>
             <a:r>
-              <a:rPr lang="en-US" smtClean="0"/>
+              <a:rPr lang="en-US"/>
               <a:t>Click to edit Master title style</a:t>
             </a:r>
-            <a:endParaRPr lang="en-US"/>
           </a:p>
         </p:txBody>
       </p:sp>
@@ -1410,7 +1404,7 @@
           <a:p>
             <a:pPr lvl="0"/>
             <a:r>
-              <a:rPr lang="en-US" smtClean="0"/>
+              <a:rPr lang="en-US"/>
               <a:t>Click to edit Master text styles</a:t>
             </a:r>
           </a:p>
@@ -1434,7 +1428,7 @@
             <a:fld id="{78C97017-6FC3-485B-9764-EAC9E56C1D49}" type="datetimeFigureOut">
               <a:rPr lang="en-US" smtClean="0"/>
               <a:pPr/>
-              <a:t>10/22/2017</a:t>
+              <a:t>10/24/2017</a:t>
             </a:fld>
             <a:endParaRPr lang="en-US"/>
           </a:p>
@@ -1486,7 +1480,7 @@
     </p:spTree>
     <p:extLst>
       <p:ext uri="{BB962C8B-B14F-4D97-AF65-F5344CB8AC3E}">
-        <p14:creationId xmlns="" xmlns:p14="http://schemas.microsoft.com/office/powerpoint/2010/main" val="474686344"/>
+        <p14:creationId xmlns:p14="http://schemas.microsoft.com/office/powerpoint/2010/main" val="474686344"/>
       </p:ext>
     </p:extLst>
   </p:cSld>
@@ -1529,10 +1523,9 @@
           <a:lstStyle/>
           <a:p>
             <a:r>
-              <a:rPr lang="en-US" smtClean="0"/>
+              <a:rPr lang="en-US"/>
               <a:t>Click to edit Master title style</a:t>
             </a:r>
-            <a:endParaRPr lang="en-US"/>
           </a:p>
         </p:txBody>
       </p:sp>
@@ -1586,38 +1579,37 @@
           <a:p>
             <a:pPr lvl="0"/>
             <a:r>
-              <a:rPr lang="en-US" smtClean="0"/>
+              <a:rPr lang="en-US"/>
               <a:t>Click to edit Master text styles</a:t>
             </a:r>
           </a:p>
           <a:p>
             <a:pPr lvl="1"/>
             <a:r>
-              <a:rPr lang="en-US" smtClean="0"/>
+              <a:rPr lang="en-US"/>
               <a:t>Second level</a:t>
             </a:r>
           </a:p>
           <a:p>
             <a:pPr lvl="2"/>
             <a:r>
-              <a:rPr lang="en-US" smtClean="0"/>
+              <a:rPr lang="en-US"/>
               <a:t>Third level</a:t>
             </a:r>
           </a:p>
           <a:p>
             <a:pPr lvl="3"/>
             <a:r>
-              <a:rPr lang="en-US" smtClean="0"/>
+              <a:rPr lang="en-US"/>
               <a:t>Fourth level</a:t>
             </a:r>
           </a:p>
           <a:p>
             <a:pPr lvl="4"/>
             <a:r>
-              <a:rPr lang="en-US" smtClean="0"/>
+              <a:rPr lang="en-US"/>
               <a:t>Fifth level</a:t>
             </a:r>
-            <a:endParaRPr lang="en-US"/>
           </a:p>
         </p:txBody>
       </p:sp>
@@ -1671,38 +1663,37 @@
           <a:p>
             <a:pPr lvl="0"/>
             <a:r>
-              <a:rPr lang="en-US" smtClean="0"/>
+              <a:rPr lang="en-US"/>
               <a:t>Click to edit Master text styles</a:t>
             </a:r>
           </a:p>
           <a:p>
             <a:pPr lvl="1"/>
             <a:r>
-              <a:rPr lang="en-US" smtClean="0"/>
+              <a:rPr lang="en-US"/>
               <a:t>Second level</a:t>
             </a:r>
           </a:p>
           <a:p>
             <a:pPr lvl="2"/>
             <a:r>
-              <a:rPr lang="en-US" smtClean="0"/>
+              <a:rPr lang="en-US"/>
               <a:t>Third level</a:t>
             </a:r>
           </a:p>
           <a:p>
             <a:pPr lvl="3"/>
             <a:r>
-              <a:rPr lang="en-US" smtClean="0"/>
+              <a:rPr lang="en-US"/>
               <a:t>Fourth level</a:t>
             </a:r>
           </a:p>
           <a:p>
             <a:pPr lvl="4"/>
             <a:r>
-              <a:rPr lang="en-US" smtClean="0"/>
+              <a:rPr lang="en-US"/>
               <a:t>Fifth level</a:t>
             </a:r>
-            <a:endParaRPr lang="en-US"/>
           </a:p>
         </p:txBody>
       </p:sp>
@@ -1724,7 +1715,7 @@
             <a:fld id="{78C97017-6FC3-485B-9764-EAC9E56C1D49}" type="datetimeFigureOut">
               <a:rPr lang="en-US" smtClean="0"/>
               <a:pPr/>
-              <a:t>10/22/2017</a:t>
+              <a:t>10/24/2017</a:t>
             </a:fld>
             <a:endParaRPr lang="en-US"/>
           </a:p>
@@ -1776,7 +1767,7 @@
     </p:spTree>
     <p:extLst>
       <p:ext uri="{BB962C8B-B14F-4D97-AF65-F5344CB8AC3E}">
-        <p14:creationId xmlns="" xmlns:p14="http://schemas.microsoft.com/office/powerpoint/2010/main" val="562293251"/>
+        <p14:creationId xmlns:p14="http://schemas.microsoft.com/office/powerpoint/2010/main" val="562293251"/>
       </p:ext>
     </p:extLst>
   </p:cSld>
@@ -1823,10 +1814,9 @@
           </a:lstStyle>
           <a:p>
             <a:r>
-              <a:rPr lang="en-US" smtClean="0"/>
+              <a:rPr lang="en-US"/>
               <a:t>Click to edit Master title style</a:t>
             </a:r>
-            <a:endParaRPr lang="en-US"/>
           </a:p>
         </p:txBody>
       </p:sp>
@@ -1889,7 +1879,7 @@
           <a:p>
             <a:pPr lvl="0"/>
             <a:r>
-              <a:rPr lang="en-US" smtClean="0"/>
+              <a:rPr lang="en-US"/>
               <a:t>Click to edit Master text styles</a:t>
             </a:r>
           </a:p>
@@ -1945,38 +1935,37 @@
           <a:p>
             <a:pPr lvl="0"/>
             <a:r>
-              <a:rPr lang="en-US" smtClean="0"/>
+              <a:rPr lang="en-US"/>
               <a:t>Click to edit Master text styles</a:t>
             </a:r>
           </a:p>
           <a:p>
             <a:pPr lvl="1"/>
             <a:r>
-              <a:rPr lang="en-US" smtClean="0"/>
+              <a:rPr lang="en-US"/>
               <a:t>Second level</a:t>
             </a:r>
           </a:p>
           <a:p>
             <a:pPr lvl="2"/>
             <a:r>
-              <a:rPr lang="en-US" smtClean="0"/>
+              <a:rPr lang="en-US"/>
               <a:t>Third level</a:t>
             </a:r>
           </a:p>
           <a:p>
             <a:pPr lvl="3"/>
             <a:r>
-              <a:rPr lang="en-US" smtClean="0"/>
+              <a:rPr lang="en-US"/>
               <a:t>Fourth level</a:t>
             </a:r>
           </a:p>
           <a:p>
             <a:pPr lvl="4"/>
             <a:r>
-              <a:rPr lang="en-US" smtClean="0"/>
+              <a:rPr lang="en-US"/>
               <a:t>Fifth level</a:t>
             </a:r>
-            <a:endParaRPr lang="en-US"/>
           </a:p>
         </p:txBody>
       </p:sp>
@@ -2039,7 +2028,7 @@
           <a:p>
             <a:pPr lvl="0"/>
             <a:r>
-              <a:rPr lang="en-US" smtClean="0"/>
+              <a:rPr lang="en-US"/>
               <a:t>Click to edit Master text styles</a:t>
             </a:r>
           </a:p>
@@ -2095,38 +2084,37 @@
           <a:p>
             <a:pPr lvl="0"/>
             <a:r>
-              <a:rPr lang="en-US" smtClean="0"/>
+              <a:rPr lang="en-US"/>
               <a:t>Click to edit Master text styles</a:t>
             </a:r>
           </a:p>
           <a:p>
             <a:pPr lvl="1"/>
             <a:r>
-              <a:rPr lang="en-US" smtClean="0"/>
+              <a:rPr lang="en-US"/>
               <a:t>Second level</a:t>
             </a:r>
           </a:p>
           <a:p>
             <a:pPr lvl="2"/>
             <a:r>
-              <a:rPr lang="en-US" smtClean="0"/>
+              <a:rPr lang="en-US"/>
               <a:t>Third level</a:t>
             </a:r>
           </a:p>
           <a:p>
             <a:pPr lvl="3"/>
             <a:r>
-              <a:rPr lang="en-US" smtClean="0"/>
+              <a:rPr lang="en-US"/>
               <a:t>Fourth level</a:t>
             </a:r>
           </a:p>
           <a:p>
             <a:pPr lvl="4"/>
             <a:r>
-              <a:rPr lang="en-US" smtClean="0"/>
+              <a:rPr lang="en-US"/>
               <a:t>Fifth level</a:t>
             </a:r>
-            <a:endParaRPr lang="en-US"/>
           </a:p>
         </p:txBody>
       </p:sp>
@@ -2148,7 +2136,7 @@
             <a:fld id="{78C97017-6FC3-485B-9764-EAC9E56C1D49}" type="datetimeFigureOut">
               <a:rPr lang="en-US" smtClean="0"/>
               <a:pPr/>
-              <a:t>10/22/2017</a:t>
+              <a:t>10/24/2017</a:t>
             </a:fld>
             <a:endParaRPr lang="en-US"/>
           </a:p>
@@ -2200,7 +2188,7 @@
     </p:spTree>
     <p:extLst>
       <p:ext uri="{BB962C8B-B14F-4D97-AF65-F5344CB8AC3E}">
-        <p14:creationId xmlns="" xmlns:p14="http://schemas.microsoft.com/office/powerpoint/2010/main" val="1126424250"/>
+        <p14:creationId xmlns:p14="http://schemas.microsoft.com/office/powerpoint/2010/main" val="1126424250"/>
       </p:ext>
     </p:extLst>
   </p:cSld>
@@ -2243,10 +2231,9 @@
           <a:lstStyle/>
           <a:p>
             <a:r>
-              <a:rPr lang="en-US" smtClean="0"/>
+              <a:rPr lang="en-US"/>
               <a:t>Click to edit Master title style</a:t>
             </a:r>
-            <a:endParaRPr lang="en-US"/>
           </a:p>
         </p:txBody>
       </p:sp>
@@ -2268,7 +2255,7 @@
             <a:fld id="{78C97017-6FC3-485B-9764-EAC9E56C1D49}" type="datetimeFigureOut">
               <a:rPr lang="en-US" smtClean="0"/>
               <a:pPr/>
-              <a:t>10/22/2017</a:t>
+              <a:t>10/24/2017</a:t>
             </a:fld>
             <a:endParaRPr lang="en-US"/>
           </a:p>
@@ -2320,7 +2307,7 @@
     </p:spTree>
     <p:extLst>
       <p:ext uri="{BB962C8B-B14F-4D97-AF65-F5344CB8AC3E}">
-        <p14:creationId xmlns="" xmlns:p14="http://schemas.microsoft.com/office/powerpoint/2010/main" val="4159724230"/>
+        <p14:creationId xmlns:p14="http://schemas.microsoft.com/office/powerpoint/2010/main" val="4159724230"/>
       </p:ext>
     </p:extLst>
   </p:cSld>
@@ -2365,7 +2352,7 @@
             <a:fld id="{78C97017-6FC3-485B-9764-EAC9E56C1D49}" type="datetimeFigureOut">
               <a:rPr lang="en-US" smtClean="0"/>
               <a:pPr/>
-              <a:t>10/22/2017</a:t>
+              <a:t>10/24/2017</a:t>
             </a:fld>
             <a:endParaRPr lang="en-US"/>
           </a:p>
@@ -2417,7 +2404,7 @@
     </p:spTree>
     <p:extLst>
       <p:ext uri="{BB962C8B-B14F-4D97-AF65-F5344CB8AC3E}">
-        <p14:creationId xmlns="" xmlns:p14="http://schemas.microsoft.com/office/powerpoint/2010/main" val="1793928710"/>
+        <p14:creationId xmlns:p14="http://schemas.microsoft.com/office/powerpoint/2010/main" val="1793928710"/>
       </p:ext>
     </p:extLst>
   </p:cSld>
@@ -2469,10 +2456,9 @@
           </a:lstStyle>
           <a:p>
             <a:r>
-              <a:rPr lang="en-US" smtClean="0"/>
+              <a:rPr lang="en-US"/>
               <a:t>Click to edit Master title style</a:t>
             </a:r>
-            <a:endParaRPr lang="en-US"/>
           </a:p>
         </p:txBody>
       </p:sp>
@@ -2526,38 +2512,37 @@
           <a:p>
             <a:pPr lvl="0"/>
             <a:r>
-              <a:rPr lang="en-US" smtClean="0"/>
+              <a:rPr lang="en-US"/>
               <a:t>Click to edit Master text styles</a:t>
             </a:r>
           </a:p>
           <a:p>
             <a:pPr lvl="1"/>
             <a:r>
-              <a:rPr lang="en-US" smtClean="0"/>
+              <a:rPr lang="en-US"/>
               <a:t>Second level</a:t>
             </a:r>
           </a:p>
           <a:p>
             <a:pPr lvl="2"/>
             <a:r>
-              <a:rPr lang="en-US" smtClean="0"/>
+              <a:rPr lang="en-US"/>
               <a:t>Third level</a:t>
             </a:r>
           </a:p>
           <a:p>
             <a:pPr lvl="3"/>
             <a:r>
-              <a:rPr lang="en-US" smtClean="0"/>
+              <a:rPr lang="en-US"/>
               <a:t>Fourth level</a:t>
             </a:r>
           </a:p>
           <a:p>
             <a:pPr lvl="4"/>
             <a:r>
-              <a:rPr lang="en-US" smtClean="0"/>
+              <a:rPr lang="en-US"/>
               <a:t>Fifth level</a:t>
             </a:r>
-            <a:endParaRPr lang="en-US"/>
           </a:p>
         </p:txBody>
       </p:sp>
@@ -2620,7 +2605,7 @@
           <a:p>
             <a:pPr lvl="0"/>
             <a:r>
-              <a:rPr lang="en-US" smtClean="0"/>
+              <a:rPr lang="en-US"/>
               <a:t>Click to edit Master text styles</a:t>
             </a:r>
           </a:p>
@@ -2644,7 +2629,7 @@
             <a:fld id="{78C97017-6FC3-485B-9764-EAC9E56C1D49}" type="datetimeFigureOut">
               <a:rPr lang="en-US" smtClean="0"/>
               <a:pPr/>
-              <a:t>10/22/2017</a:t>
+              <a:t>10/24/2017</a:t>
             </a:fld>
             <a:endParaRPr lang="en-US"/>
           </a:p>
@@ -2696,7 +2681,7 @@
     </p:spTree>
     <p:extLst>
       <p:ext uri="{BB962C8B-B14F-4D97-AF65-F5344CB8AC3E}">
-        <p14:creationId xmlns="" xmlns:p14="http://schemas.microsoft.com/office/powerpoint/2010/main" val="2076802089"/>
+        <p14:creationId xmlns:p14="http://schemas.microsoft.com/office/powerpoint/2010/main" val="2076802089"/>
       </p:ext>
     </p:extLst>
   </p:cSld>
@@ -2748,10 +2733,9 @@
           </a:lstStyle>
           <a:p>
             <a:r>
-              <a:rPr lang="en-US" smtClean="0"/>
+              <a:rPr lang="en-US"/>
               <a:t>Click to edit Master title style</a:t>
             </a:r>
-            <a:endParaRPr lang="en-US"/>
           </a:p>
         </p:txBody>
       </p:sp>
@@ -2875,7 +2859,7 @@
           <a:p>
             <a:pPr lvl="0"/>
             <a:r>
-              <a:rPr lang="en-US" smtClean="0"/>
+              <a:rPr lang="en-US"/>
               <a:t>Click to edit Master text styles</a:t>
             </a:r>
           </a:p>
@@ -2899,7 +2883,7 @@
             <a:fld id="{78C97017-6FC3-485B-9764-EAC9E56C1D49}" type="datetimeFigureOut">
               <a:rPr lang="en-US" smtClean="0"/>
               <a:pPr/>
-              <a:t>10/22/2017</a:t>
+              <a:t>10/24/2017</a:t>
             </a:fld>
             <a:endParaRPr lang="en-US"/>
           </a:p>
@@ -2951,7 +2935,7 @@
     </p:spTree>
     <p:extLst>
       <p:ext uri="{BB962C8B-B14F-4D97-AF65-F5344CB8AC3E}">
-        <p14:creationId xmlns="" xmlns:p14="http://schemas.microsoft.com/office/powerpoint/2010/main" val="201835938"/>
+        <p14:creationId xmlns:p14="http://schemas.microsoft.com/office/powerpoint/2010/main" val="201835938"/>
       </p:ext>
     </p:extLst>
   </p:cSld>
@@ -3009,10 +2993,9 @@
           <a:lstStyle/>
           <a:p>
             <a:r>
-              <a:rPr lang="en-US" smtClean="0"/>
+              <a:rPr lang="en-US"/>
               <a:t>Click to edit Master title style</a:t>
             </a:r>
-            <a:endParaRPr lang="en-US"/>
           </a:p>
         </p:txBody>
       </p:sp>
@@ -3043,38 +3026,37 @@
           <a:p>
             <a:pPr lvl="0"/>
             <a:r>
-              <a:rPr lang="en-US" smtClean="0"/>
+              <a:rPr lang="en-US"/>
               <a:t>Click to edit Master text styles</a:t>
             </a:r>
           </a:p>
           <a:p>
             <a:pPr lvl="1"/>
             <a:r>
-              <a:rPr lang="en-US" smtClean="0"/>
+              <a:rPr lang="en-US"/>
               <a:t>Second level</a:t>
             </a:r>
           </a:p>
           <a:p>
             <a:pPr lvl="2"/>
             <a:r>
-              <a:rPr lang="en-US" smtClean="0"/>
+              <a:rPr lang="en-US"/>
               <a:t>Third level</a:t>
             </a:r>
           </a:p>
           <a:p>
             <a:pPr lvl="3"/>
             <a:r>
-              <a:rPr lang="en-US" smtClean="0"/>
+              <a:rPr lang="en-US"/>
               <a:t>Fourth level</a:t>
             </a:r>
           </a:p>
           <a:p>
             <a:pPr lvl="4"/>
             <a:r>
-              <a:rPr lang="en-US" smtClean="0"/>
+              <a:rPr lang="en-US"/>
               <a:t>Fifth level</a:t>
             </a:r>
-            <a:endParaRPr lang="en-US"/>
           </a:p>
         </p:txBody>
       </p:sp>
@@ -3114,7 +3096,7 @@
             <a:fld id="{78C97017-6FC3-485B-9764-EAC9E56C1D49}" type="datetimeFigureOut">
               <a:rPr lang="en-US" smtClean="0"/>
               <a:pPr/>
-              <a:t>10/22/2017</a:t>
+              <a:t>10/24/2017</a:t>
             </a:fld>
             <a:endParaRPr lang="en-US"/>
           </a:p>
@@ -3202,7 +3184,7 @@
     </p:spTree>
     <p:extLst>
       <p:ext uri="{BB962C8B-B14F-4D97-AF65-F5344CB8AC3E}">
-        <p14:creationId xmlns="" xmlns:p14="http://schemas.microsoft.com/office/powerpoint/2010/main" val="2341400630"/>
+        <p14:creationId xmlns:p14="http://schemas.microsoft.com/office/powerpoint/2010/main" val="2341400630"/>
       </p:ext>
     </p:extLst>
   </p:cSld>
@@ -3536,7 +3518,7 @@
           <a:lstStyle/>
           <a:p>
             <a:r>
-              <a:rPr lang="en-US" sz="1200" b="1" dirty="0" smtClean="0">
+              <a:rPr lang="en-US" sz="1200" b="1" dirty="0">
                 <a:solidFill>
                   <a:srgbClr val="7030A0"/>
                 </a:solidFill>
@@ -3595,7 +3577,7 @@
           <a:p>
             <a:pPr algn="ctr"/>
             <a:r>
-              <a:rPr lang="en-US" sz="1050" dirty="0" err="1" smtClean="0">
+              <a:rPr lang="en-US" sz="1050" dirty="0" err="1">
                 <a:solidFill>
                   <a:schemeClr val="bg1"/>
                 </a:solidFill>
@@ -3654,7 +3636,7 @@
           <a:p>
             <a:pPr algn="ctr"/>
             <a:r>
-              <a:rPr lang="en-US" sz="1050" dirty="0" err="1" smtClean="0">
+              <a:rPr lang="en-US" sz="1050" dirty="0" err="1">
                 <a:solidFill>
                   <a:schemeClr val="bg1"/>
                 </a:solidFill>
@@ -3669,47 +3651,6 @@
           </a:p>
         </p:txBody>
       </p:sp>
-      <p:cxnSp>
-        <p:nvCxnSpPr>
-          <p:cNvPr id="53" name="Elbow Connector 63"/>
-          <p:cNvCxnSpPr>
-            <a:stCxn id="71" idx="3"/>
-          </p:cNvCxnSpPr>
-          <p:nvPr/>
-        </p:nvCxnSpPr>
-        <p:spPr>
-          <a:xfrm flipV="1">
-            <a:off x="6477000" y="3194131"/>
-            <a:ext cx="95385" cy="416514"/>
-          </a:xfrm>
-          <a:prstGeom prst="bentConnector2">
-            <a:avLst/>
-          </a:prstGeom>
-          <a:ln w="19050">
-            <a:solidFill>
-              <a:srgbClr val="7030A0"/>
-            </a:solidFill>
-            <a:prstDash val="sysDot"/>
-            <a:headEnd type="none" w="med" len="med"/>
-            <a:tailEnd type="none" w="med" len="med"/>
-          </a:ln>
-          <a:effectLst/>
-        </p:spPr>
-        <p:style>
-          <a:lnRef idx="1">
-            <a:schemeClr val="accent2"/>
-          </a:lnRef>
-          <a:fillRef idx="2">
-            <a:schemeClr val="accent2"/>
-          </a:fillRef>
-          <a:effectRef idx="1">
-            <a:schemeClr val="accent2"/>
-          </a:effectRef>
-          <a:fontRef idx="minor">
-            <a:schemeClr val="dk1"/>
-          </a:fontRef>
-        </p:style>
-      </p:cxnSp>
       <p:cxnSp>
         <p:nvCxnSpPr>
           <p:cNvPr id="107" name="Elbow Connector 106"/>
@@ -3725,7 +3666,7 @@
           </a:xfrm>
           <a:prstGeom prst="bentConnector4">
             <a:avLst>
-              <a:gd name="adj1" fmla="val -101829"/>
+              <a:gd name="adj1" fmla="val -157020"/>
               <a:gd name="adj2" fmla="val 99976"/>
             </a:avLst>
           </a:prstGeom>
@@ -3809,7 +3750,7 @@
           <a:p>
             <a:pPr algn="ctr"/>
             <a:r>
-              <a:rPr lang="en-US" sz="1050" dirty="0" smtClean="0">
+              <a:rPr lang="en-US" sz="1050" dirty="0">
                 <a:solidFill>
                   <a:schemeClr val="bg1"/>
                 </a:solidFill>
@@ -3919,8 +3860,8 @@
           <p:nvPr/>
         </p:nvSpPr>
         <p:spPr>
-          <a:xfrm rot="5400000" flipV="1">
-            <a:off x="6253986" y="3522883"/>
+          <a:xfrm rot="10800000" flipV="1">
+            <a:off x="6756701" y="2162069"/>
             <a:ext cx="270504" cy="175523"/>
           </a:xfrm>
           <a:prstGeom prst="triangle">
@@ -4133,7 +4074,7 @@
           <a:p>
             <a:pPr algn="ctr"/>
             <a:r>
-              <a:rPr lang="en-US" sz="1050" dirty="0" err="1" smtClean="0">
+              <a:rPr lang="en-US" sz="1050" dirty="0" err="1">
                 <a:solidFill>
                   <a:srgbClr val="7030A0"/>
                 </a:solidFill>
@@ -4275,7 +4216,7 @@
           <a:p>
             <a:pPr algn="ctr"/>
             <a:r>
-              <a:rPr lang="en-US" sz="1050" dirty="0" err="1" smtClean="0">
+              <a:rPr lang="en-US" sz="1050" dirty="0" err="1">
                 <a:solidFill>
                   <a:srgbClr val="7030A0"/>
                 </a:solidFill>
@@ -4419,7 +4360,7 @@
           <a:p>
             <a:pPr algn="ctr"/>
             <a:r>
-              <a:rPr lang="en-US" sz="1050" dirty="0" err="1" smtClean="0">
+              <a:rPr lang="en-US" sz="1050" dirty="0" err="1">
                 <a:solidFill>
                   <a:srgbClr val="7030A0"/>
                 </a:solidFill>
@@ -4518,7 +4459,7 @@
           <a:p>
             <a:pPr algn="ctr"/>
             <a:r>
-              <a:rPr lang="en-US" sz="1050" dirty="0" smtClean="0">
+              <a:rPr lang="en-US" sz="1050" dirty="0">
                 <a:solidFill>
                   <a:srgbClr val="7030A0"/>
                 </a:solidFill>
@@ -4660,7 +4601,7 @@
           <a:p>
             <a:pPr algn="ctr"/>
             <a:r>
-              <a:rPr lang="en-US" sz="1050" dirty="0" smtClean="0">
+              <a:rPr lang="en-US" sz="1050" dirty="0">
                 <a:solidFill>
                   <a:srgbClr val="7030A0"/>
                 </a:solidFill>
@@ -4769,7 +4710,7 @@
         </p:nvSpPr>
         <p:spPr>
           <a:xfrm>
-            <a:off x="5128257" y="3429000"/>
+            <a:off x="6135256" y="1809332"/>
             <a:ext cx="1156969" cy="346760"/>
           </a:xfrm>
           <a:prstGeom prst="rect">
@@ -4802,7 +4743,7 @@
           <a:p>
             <a:pPr algn="ctr"/>
             <a:r>
-              <a:rPr lang="en-US" sz="1050" dirty="0" smtClean="0">
+              <a:rPr lang="en-US" sz="1050" dirty="0">
                 <a:solidFill>
                   <a:srgbClr val="7030A0"/>
                 </a:solidFill>
@@ -4810,14 +4751,14 @@
               <a:t>&lt;&lt;interface&gt;&gt;</a:t>
             </a:r>
             <a:br>
-              <a:rPr lang="en-US" sz="1050" dirty="0" smtClean="0">
+              <a:rPr lang="en-US" sz="1050" dirty="0">
                 <a:solidFill>
                   <a:srgbClr val="7030A0"/>
                 </a:solidFill>
               </a:rPr>
             </a:br>
             <a:r>
-              <a:rPr lang="en-US" sz="1050" dirty="0" err="1" smtClean="0">
+              <a:rPr lang="en-US" sz="1050" dirty="0" err="1">
                 <a:solidFill>
                   <a:srgbClr val="7030A0"/>
                 </a:solidFill>
@@ -4873,7 +4814,7 @@
           <a:p>
             <a:pPr algn="ctr"/>
             <a:r>
-              <a:rPr lang="en-US" sz="1050" dirty="0" smtClean="0">
+              <a:rPr lang="en-US" sz="1050" dirty="0">
                 <a:solidFill>
                   <a:srgbClr val="7030A0"/>
                 </a:solidFill>
@@ -5017,7 +4958,7 @@
           <a:p>
             <a:pPr algn="ctr"/>
             <a:r>
-              <a:rPr lang="en-US" sz="1050" dirty="0" smtClean="0">
+              <a:rPr lang="en-US" sz="1050" dirty="0">
                 <a:solidFill>
                   <a:srgbClr val="7030A0"/>
                 </a:solidFill>
@@ -5114,7 +5055,7 @@
           <a:p>
             <a:pPr algn="ctr"/>
             <a:r>
-              <a:rPr lang="en-US" sz="1050" dirty="0" smtClean="0">
+              <a:rPr lang="en-US" sz="1050" dirty="0">
                 <a:solidFill>
                   <a:srgbClr val="7030A0"/>
                 </a:solidFill>
@@ -5211,7 +5152,7 @@
           <a:p>
             <a:pPr algn="ctr"/>
             <a:r>
-              <a:rPr lang="en-US" sz="1050" dirty="0" smtClean="0">
+              <a:rPr lang="en-US" sz="1050" dirty="0">
                 <a:solidFill>
                   <a:srgbClr val="7030A0"/>
                 </a:solidFill>
@@ -5399,7 +5340,7 @@
           <a:p>
             <a:pPr algn="ctr"/>
             <a:r>
-              <a:rPr lang="en-US" sz="1050" dirty="0" smtClean="0">
+              <a:rPr lang="en-US" sz="1050" dirty="0">
                 <a:solidFill>
                   <a:srgbClr val="7030A0"/>
                 </a:solidFill>
@@ -5407,14 +5348,14 @@
               <a:t>&lt;&lt;interface&gt;&gt;</a:t>
             </a:r>
             <a:br>
-              <a:rPr lang="en-US" sz="1050" dirty="0" smtClean="0">
+              <a:rPr lang="en-US" sz="1050" dirty="0">
                 <a:solidFill>
                   <a:srgbClr val="7030A0"/>
                 </a:solidFill>
               </a:rPr>
             </a:br>
             <a:r>
-              <a:rPr lang="en-US" sz="1050" dirty="0" err="1" smtClean="0">
+              <a:rPr lang="en-US" sz="1050" dirty="0" err="1">
                 <a:solidFill>
                   <a:srgbClr val="7030A0"/>
                 </a:solidFill>
@@ -5453,7 +5394,7 @@
           <a:p>
             <a:pPr algn="r"/>
             <a:r>
-              <a:rPr lang="en-US" sz="1100" dirty="0" smtClean="0">
+              <a:rPr lang="en-US" sz="1100" dirty="0">
                 <a:solidFill>
                   <a:srgbClr val="7030A0"/>
                 </a:solidFill>
@@ -5509,20 +5450,12 @@
           <a:p>
             <a:pPr algn="ctr"/>
             <a:r>
-              <a:rPr lang="en-US" sz="1050" dirty="0" smtClean="0">
+              <a:rPr lang="en-US" sz="1050" dirty="0">
                 <a:solidFill>
                   <a:srgbClr val="7030A0"/>
                 </a:solidFill>
               </a:rPr>
               <a:t>&lt;&lt;interface&gt;&gt;</a:t>
-            </a:r>
-            <a:r>
-              <a:rPr lang="en-US" sz="1050">
-                <a:solidFill>
-                  <a:srgbClr val="7030A0"/>
-                </a:solidFill>
-              </a:rPr>
-              <a:t/>
             </a:r>
             <a:br>
               <a:rPr lang="en-US" sz="1050">
@@ -5532,7 +5465,7 @@
               </a:rPr>
             </a:br>
             <a:r>
-              <a:rPr lang="en-US" sz="1050" dirty="0" err="1" smtClean="0">
+              <a:rPr lang="en-US" sz="1050" dirty="0" err="1">
                 <a:solidFill>
                   <a:srgbClr val="7030A0"/>
                 </a:solidFill>
@@ -5593,6 +5526,7 @@
         <p:nvCxnSpPr>
           <p:cNvPr id="50" name="Elbow Connector 49"/>
           <p:cNvCxnSpPr>
+            <a:cxnSpLocks/>
             <a:stCxn id="62" idx="0"/>
             <a:endCxn id="57" idx="3"/>
           </p:cNvCxnSpPr>
@@ -5654,7 +5588,7 @@
           <a:p>
             <a:pPr algn="ctr"/>
             <a:r>
-              <a:rPr lang="en-US" sz="1100" dirty="0" smtClean="0">
+              <a:rPr lang="en-US" sz="1100" dirty="0">
                 <a:solidFill>
                   <a:srgbClr val="7030A0"/>
                 </a:solidFill>
@@ -5693,7 +5627,7 @@
           <a:p>
             <a:pPr algn="ctr"/>
             <a:r>
-              <a:rPr lang="en-US" sz="1100" dirty="0" smtClean="0">
+              <a:rPr lang="en-US" sz="1100" dirty="0">
                 <a:solidFill>
                   <a:srgbClr val="7030A0"/>
                 </a:solidFill>
@@ -5732,7 +5666,7 @@
           <a:p>
             <a:pPr algn="ctr"/>
             <a:r>
-              <a:rPr lang="en-US" sz="1100" dirty="0" smtClean="0">
+              <a:rPr lang="en-US" sz="1100" dirty="0">
                 <a:solidFill>
                   <a:srgbClr val="7030A0"/>
                 </a:solidFill>
@@ -5771,7 +5705,7 @@
           <a:p>
             <a:pPr algn="ctr"/>
             <a:r>
-              <a:rPr lang="en-US" sz="1100" dirty="0" smtClean="0">
+              <a:rPr lang="en-US" sz="1100" dirty="0">
                 <a:solidFill>
                   <a:srgbClr val="7030A0"/>
                 </a:solidFill>
@@ -5810,7 +5744,7 @@
           <a:p>
             <a:pPr algn="ctr"/>
             <a:r>
-              <a:rPr lang="en-US" sz="1100" dirty="0" smtClean="0">
+              <a:rPr lang="en-US" sz="1100" dirty="0">
                 <a:solidFill>
                   <a:srgbClr val="7030A0"/>
                 </a:solidFill>
@@ -5849,7 +5783,7 @@
           <a:p>
             <a:pPr algn="ctr"/>
             <a:r>
-              <a:rPr lang="en-US" sz="1100" dirty="0" smtClean="0">
+              <a:rPr lang="en-US" sz="1100" dirty="0">
                 <a:solidFill>
                   <a:srgbClr val="7030A0"/>
                 </a:solidFill>
@@ -5888,7 +5822,7 @@
           <a:p>
             <a:pPr algn="ctr"/>
             <a:r>
-              <a:rPr lang="en-US" sz="1100" dirty="0" smtClean="0">
+              <a:rPr lang="en-US" sz="1100" dirty="0">
                 <a:solidFill>
                   <a:srgbClr val="7030A0"/>
                 </a:solidFill>
@@ -5911,7 +5845,7 @@
         </p:nvSpPr>
         <p:spPr>
           <a:xfrm>
-            <a:off x="6667770" y="3210194"/>
+            <a:off x="6889223" y="2674015"/>
             <a:ext cx="189257" cy="178683"/>
           </a:xfrm>
           <a:prstGeom prst="rect">
@@ -5927,7 +5861,7 @@
           <a:p>
             <a:pPr algn="ctr"/>
             <a:r>
-              <a:rPr lang="en-US" sz="1100" dirty="0" smtClean="0">
+              <a:rPr lang="en-US" sz="1100" dirty="0">
                 <a:solidFill>
                   <a:srgbClr val="7030A0"/>
                 </a:solidFill>
@@ -5983,7 +5917,7 @@
           <a:p>
             <a:pPr algn="ctr"/>
             <a:r>
-              <a:rPr lang="en-US" sz="1050" dirty="0" smtClean="0">
+              <a:rPr lang="en-US" sz="1050" dirty="0">
                 <a:solidFill>
                   <a:srgbClr val="7030A0"/>
                 </a:solidFill>
@@ -6041,23 +5975,422 @@
           </a:fontRef>
         </p:style>
       </p:cxnSp>
+      <p:cxnSp>
+        <p:nvCxnSpPr>
+          <p:cNvPr id="10" name="Straight Connector 9">
+            <a:extLst>
+              <a:ext uri="{FF2B5EF4-FFF2-40B4-BE49-F238E27FC236}">
+                <a16:creationId xmlns:a16="http://schemas.microsoft.com/office/drawing/2014/main" id="{9E36A53B-B5B1-43DB-BC32-54A5DF97C1B6}"/>
+              </a:ext>
+            </a:extLst>
+          </p:cNvPr>
+          <p:cNvCxnSpPr>
+            <a:cxnSpLocks/>
+          </p:cNvCxnSpPr>
+          <p:nvPr/>
+        </p:nvCxnSpPr>
+        <p:spPr>
+          <a:xfrm>
+            <a:off x="6892368" y="2338777"/>
+            <a:ext cx="0" cy="519289"/>
+          </a:xfrm>
+          <a:prstGeom prst="line">
+            <a:avLst/>
+          </a:prstGeom>
+          <a:ln w="19050">
+            <a:solidFill>
+              <a:srgbClr val="7030A0"/>
+            </a:solidFill>
+            <a:headEnd type="none" w="med" len="med"/>
+            <a:tailEnd type="none" w="med" len="med"/>
+          </a:ln>
+          <a:effectLst/>
+        </p:spPr>
+        <p:style>
+          <a:lnRef idx="1">
+            <a:schemeClr val="accent2"/>
+          </a:lnRef>
+          <a:fillRef idx="2">
+            <a:schemeClr val="accent2"/>
+          </a:fillRef>
+          <a:effectRef idx="1">
+            <a:schemeClr val="accent2"/>
+          </a:effectRef>
+          <a:fontRef idx="minor">
+            <a:schemeClr val="dk1"/>
+          </a:fontRef>
+        </p:style>
+      </p:cxnSp>
+      <p:cxnSp>
+        <p:nvCxnSpPr>
+          <p:cNvPr id="77" name="Elbow Connector 49">
+            <a:extLst>
+              <a:ext uri="{FF2B5EF4-FFF2-40B4-BE49-F238E27FC236}">
+                <a16:creationId xmlns:a16="http://schemas.microsoft.com/office/drawing/2014/main" id="{B3926F5D-BFEB-432B-8C4D-AFE10B1694F8}"/>
+              </a:ext>
+            </a:extLst>
+          </p:cNvPr>
+          <p:cNvCxnSpPr>
+            <a:cxnSpLocks/>
+            <a:stCxn id="62" idx="2"/>
+          </p:cNvCxnSpPr>
+          <p:nvPr/>
+        </p:nvCxnSpPr>
+        <p:spPr>
+          <a:xfrm rot="5400000">
+            <a:off x="5971190" y="2876432"/>
+            <a:ext cx="368187" cy="1024974"/>
+          </a:xfrm>
+          <a:prstGeom prst="bentConnector2">
+            <a:avLst/>
+          </a:prstGeom>
+          <a:ln w="19050">
+            <a:solidFill>
+              <a:srgbClr val="7030A0"/>
+            </a:solidFill>
+            <a:headEnd type="none" w="med" len="med"/>
+            <a:tailEnd type="arrow" w="med" len="med"/>
+          </a:ln>
+          <a:effectLst/>
+        </p:spPr>
+        <p:style>
+          <a:lnRef idx="1">
+            <a:schemeClr val="accent2"/>
+          </a:lnRef>
+          <a:fillRef idx="2">
+            <a:schemeClr val="accent2"/>
+          </a:fillRef>
+          <a:effectRef idx="1">
+            <a:schemeClr val="accent2"/>
+          </a:effectRef>
+          <a:fontRef idx="minor">
+            <a:schemeClr val="dk1"/>
+          </a:fontRef>
+        </p:style>
+      </p:cxnSp>
+      <p:sp>
+        <p:nvSpPr>
+          <p:cNvPr id="82" name="Rectangle 8">
+            <a:extLst>
+              <a:ext uri="{FF2B5EF4-FFF2-40B4-BE49-F238E27FC236}">
+                <a16:creationId xmlns:a16="http://schemas.microsoft.com/office/drawing/2014/main" id="{0978622F-905F-46B5-B7DD-0C6ECB130AF4}"/>
+              </a:ext>
+            </a:extLst>
+          </p:cNvPr>
+          <p:cNvSpPr/>
+          <p:nvPr/>
+        </p:nvSpPr>
+        <p:spPr>
+          <a:xfrm>
+            <a:off x="4418813" y="3388936"/>
+            <a:ext cx="1223983" cy="346760"/>
+          </a:xfrm>
+          <a:prstGeom prst="rect">
+            <a:avLst/>
+          </a:prstGeom>
+          <a:ln w="19050">
+            <a:solidFill>
+              <a:srgbClr val="7030A0"/>
+            </a:solidFill>
+          </a:ln>
+          <a:effectLst/>
+        </p:spPr>
+        <p:style>
+          <a:lnRef idx="1">
+            <a:schemeClr val="accent4"/>
+          </a:lnRef>
+          <a:fillRef idx="2">
+            <a:schemeClr val="accent4"/>
+          </a:fillRef>
+          <a:effectRef idx="1">
+            <a:schemeClr val="accent4"/>
+          </a:effectRef>
+          <a:fontRef idx="minor">
+            <a:schemeClr val="dk1"/>
+          </a:fontRef>
+        </p:style>
+        <p:txBody>
+          <a:bodyPr rtlCol="0" anchor="ctr"/>
+          <a:lstStyle/>
+          <a:p>
+            <a:pPr algn="ctr"/>
+            <a:r>
+              <a:rPr lang="en-US" sz="1050" dirty="0" err="1">
+                <a:solidFill>
+                  <a:srgbClr val="7030A0"/>
+                </a:solidFill>
+              </a:rPr>
+              <a:t>UniqueMeetingList</a:t>
+            </a:r>
+            <a:endParaRPr lang="en-SG" sz="1050" dirty="0">
+              <a:solidFill>
+                <a:srgbClr val="7030A0"/>
+              </a:solidFill>
+            </a:endParaRPr>
+          </a:p>
+        </p:txBody>
+      </p:sp>
+      <p:sp>
+        <p:nvSpPr>
+          <p:cNvPr id="87" name="Flowchart: Decision 96">
+            <a:extLst>
+              <a:ext uri="{FF2B5EF4-FFF2-40B4-BE49-F238E27FC236}">
+                <a16:creationId xmlns:a16="http://schemas.microsoft.com/office/drawing/2014/main" id="{4B87CC91-C5D3-4849-81F4-076DDD9FB4C9}"/>
+              </a:ext>
+            </a:extLst>
+          </p:cNvPr>
+          <p:cNvSpPr/>
+          <p:nvPr/>
+        </p:nvSpPr>
+        <p:spPr>
+          <a:xfrm rot="21440633">
+            <a:off x="4194891" y="3460334"/>
+            <a:ext cx="236048" cy="173380"/>
+          </a:xfrm>
+          <a:prstGeom prst="flowChartDecision">
+            <a:avLst/>
+          </a:prstGeom>
+          <a:noFill/>
+          <a:ln w="19050">
+            <a:solidFill>
+              <a:srgbClr val="7030A0"/>
+            </a:solidFill>
+          </a:ln>
+          <a:effectLst/>
+        </p:spPr>
+        <p:style>
+          <a:lnRef idx="1">
+            <a:schemeClr val="accent6"/>
+          </a:lnRef>
+          <a:fillRef idx="2">
+            <a:schemeClr val="accent6"/>
+          </a:fillRef>
+          <a:effectRef idx="1">
+            <a:schemeClr val="accent6"/>
+          </a:effectRef>
+          <a:fontRef idx="minor">
+            <a:schemeClr val="dk1"/>
+          </a:fontRef>
+        </p:style>
+        <p:txBody>
+          <a:bodyPr rtlCol="0" anchor="ctr"/>
+          <a:lstStyle/>
+          <a:p>
+            <a:pPr algn="ctr"/>
+            <a:endParaRPr lang="en-US" sz="1050"/>
+          </a:p>
+        </p:txBody>
+      </p:sp>
+      <p:cxnSp>
+        <p:nvCxnSpPr>
+          <p:cNvPr id="88" name="Elbow Connector 68">
+            <a:extLst>
+              <a:ext uri="{FF2B5EF4-FFF2-40B4-BE49-F238E27FC236}">
+                <a16:creationId xmlns:a16="http://schemas.microsoft.com/office/drawing/2014/main" id="{D2201285-DBB6-458C-8C9F-CD2B3AC81551}"/>
+              </a:ext>
+            </a:extLst>
+          </p:cNvPr>
+          <p:cNvCxnSpPr>
+            <a:cxnSpLocks/>
+            <a:stCxn id="87" idx="1"/>
+            <a:endCxn id="89" idx="0"/>
+          </p:cNvCxnSpPr>
+          <p:nvPr/>
+        </p:nvCxnSpPr>
+        <p:spPr>
+          <a:xfrm rot="10800000" flipV="1">
+            <a:off x="4102328" y="3552493"/>
+            <a:ext cx="92691" cy="249224"/>
+          </a:xfrm>
+          <a:prstGeom prst="bentConnector2">
+            <a:avLst/>
+          </a:prstGeom>
+          <a:ln w="19050">
+            <a:solidFill>
+              <a:srgbClr val="7030A0"/>
+            </a:solidFill>
+            <a:headEnd type="none" w="med" len="med"/>
+            <a:tailEnd type="arrow" w="med" len="med"/>
+          </a:ln>
+          <a:effectLst/>
+        </p:spPr>
+        <p:style>
+          <a:lnRef idx="1">
+            <a:schemeClr val="accent2"/>
+          </a:lnRef>
+          <a:fillRef idx="2">
+            <a:schemeClr val="accent2"/>
+          </a:fillRef>
+          <a:effectRef idx="1">
+            <a:schemeClr val="accent2"/>
+          </a:effectRef>
+          <a:fontRef idx="minor">
+            <a:schemeClr val="dk1"/>
+          </a:fontRef>
+        </p:style>
+      </p:cxnSp>
+      <p:sp>
+        <p:nvSpPr>
+          <p:cNvPr id="89" name="Rectangle 8">
+            <a:extLst>
+              <a:ext uri="{FF2B5EF4-FFF2-40B4-BE49-F238E27FC236}">
+                <a16:creationId xmlns:a16="http://schemas.microsoft.com/office/drawing/2014/main" id="{413980D6-5BEE-4262-B01C-1A017C003AEA}"/>
+              </a:ext>
+            </a:extLst>
+          </p:cNvPr>
+          <p:cNvSpPr/>
+          <p:nvPr/>
+        </p:nvSpPr>
+        <p:spPr>
+          <a:xfrm>
+            <a:off x="3710981" y="3801717"/>
+            <a:ext cx="782692" cy="346760"/>
+          </a:xfrm>
+          <a:prstGeom prst="rect">
+            <a:avLst/>
+          </a:prstGeom>
+          <a:ln w="19050">
+            <a:solidFill>
+              <a:srgbClr val="7030A0"/>
+            </a:solidFill>
+          </a:ln>
+          <a:effectLst/>
+        </p:spPr>
+        <p:style>
+          <a:lnRef idx="1">
+            <a:schemeClr val="accent4"/>
+          </a:lnRef>
+          <a:fillRef idx="2">
+            <a:schemeClr val="accent4"/>
+          </a:fillRef>
+          <a:effectRef idx="1">
+            <a:schemeClr val="accent4"/>
+          </a:effectRef>
+          <a:fontRef idx="minor">
+            <a:schemeClr val="dk1"/>
+          </a:fontRef>
+        </p:style>
+        <p:txBody>
+          <a:bodyPr rtlCol="0" anchor="ctr"/>
+          <a:lstStyle/>
+          <a:p>
+            <a:pPr algn="ctr"/>
+            <a:r>
+              <a:rPr lang="en-US" sz="1050" dirty="0">
+                <a:solidFill>
+                  <a:srgbClr val="7030A0"/>
+                </a:solidFill>
+              </a:rPr>
+              <a:t>Meeting</a:t>
+            </a:r>
+            <a:endParaRPr lang="en-SG" sz="1050" dirty="0">
+              <a:solidFill>
+                <a:srgbClr val="7030A0"/>
+              </a:solidFill>
+            </a:endParaRPr>
+          </a:p>
+        </p:txBody>
+      </p:sp>
+      <p:sp>
+        <p:nvSpPr>
+          <p:cNvPr id="90" name="TextBox 89">
+            <a:extLst>
+              <a:ext uri="{FF2B5EF4-FFF2-40B4-BE49-F238E27FC236}">
+                <a16:creationId xmlns:a16="http://schemas.microsoft.com/office/drawing/2014/main" id="{61D250D2-99B4-4618-B7B6-A2B04E058D6B}"/>
+              </a:ext>
+            </a:extLst>
+          </p:cNvPr>
+          <p:cNvSpPr txBox="1"/>
+          <p:nvPr/>
+        </p:nvSpPr>
+        <p:spPr>
+          <a:xfrm>
+            <a:off x="3902813" y="3681323"/>
+            <a:ext cx="189257" cy="178683"/>
+          </a:xfrm>
+          <a:prstGeom prst="rect">
+            <a:avLst/>
+          </a:prstGeom>
+          <a:noFill/>
+        </p:spPr>
+        <p:txBody>
+          <a:bodyPr wrap="square" lIns="0" tIns="0" rIns="0" bIns="0" rtlCol="0">
+            <a:noAutofit/>
+          </a:bodyPr>
+          <a:lstStyle/>
+          <a:p>
+            <a:pPr algn="ctr"/>
+            <a:r>
+              <a:rPr lang="en-US" sz="1100" dirty="0">
+                <a:solidFill>
+                  <a:srgbClr val="7030A0"/>
+                </a:solidFill>
+              </a:rPr>
+              <a:t>*</a:t>
+            </a:r>
+            <a:endParaRPr lang="en-SG" sz="1100" dirty="0">
+              <a:solidFill>
+                <a:srgbClr val="7030A0"/>
+              </a:solidFill>
+            </a:endParaRPr>
+          </a:p>
+        </p:txBody>
+      </p:sp>
+      <p:sp>
+        <p:nvSpPr>
+          <p:cNvPr id="91" name="TextBox 90">
+            <a:extLst>
+              <a:ext uri="{FF2B5EF4-FFF2-40B4-BE49-F238E27FC236}">
+                <a16:creationId xmlns:a16="http://schemas.microsoft.com/office/drawing/2014/main" id="{85040E2B-0692-4AAF-BA70-C6570BB1BBBF}"/>
+              </a:ext>
+            </a:extLst>
+          </p:cNvPr>
+          <p:cNvSpPr txBox="1"/>
+          <p:nvPr/>
+        </p:nvSpPr>
+        <p:spPr>
+          <a:xfrm>
+            <a:off x="5631496" y="3620480"/>
+            <a:ext cx="189257" cy="178683"/>
+          </a:xfrm>
+          <a:prstGeom prst="rect">
+            <a:avLst/>
+          </a:prstGeom>
+          <a:noFill/>
+        </p:spPr>
+        <p:txBody>
+          <a:bodyPr wrap="square" lIns="0" tIns="0" rIns="0" bIns="0" rtlCol="0">
+            <a:noAutofit/>
+          </a:bodyPr>
+          <a:lstStyle/>
+          <a:p>
+            <a:pPr algn="ctr"/>
+            <a:r>
+              <a:rPr lang="en-US" sz="1100" dirty="0">
+                <a:solidFill>
+                  <a:srgbClr val="7030A0"/>
+                </a:solidFill>
+              </a:rPr>
+              <a:t>1</a:t>
+            </a:r>
+            <a:endParaRPr lang="en-SG" sz="1100" dirty="0">
+              <a:solidFill>
+                <a:srgbClr val="7030A0"/>
+              </a:solidFill>
+            </a:endParaRPr>
+          </a:p>
+        </p:txBody>
+      </p:sp>
     </p:spTree>
     <p:extLst>
       <p:ext uri="{BB962C8B-B14F-4D97-AF65-F5344CB8AC3E}">
-        <p14:creationId xmlns="" xmlns:p14="http://schemas.microsoft.com/office/powerpoint/2010/main" val="2396968029"/>
+        <p14:creationId xmlns:p14="http://schemas.microsoft.com/office/powerpoint/2010/main" val="2396968029"/>
       </p:ext>
     </p:extLst>
   </p:cSld>
   <p:clrMapOvr>
     <a:masterClrMapping/>
   </p:clrMapOvr>
-  <p:timing>
-    <p:tnLst>
-      <p:par>
-        <p:cTn id="1" dur="indefinite" restart="never" nodeType="tmRoot"/>
-      </p:par>
-    </p:tnLst>
-  </p:timing>
 </p:sld>
 </file>
 

</xml_diff>